<commit_message>
Corrected errors in SAP
</commit_message>
<xml_diff>
--- a/official/WCP52 Gain-Phase System Architecture Presentation.pptx
+++ b/official/WCP52 Gain-Phase System Architecture Presentation.pptx
@@ -236,7 +236,7 @@
   </p:defaultTextStyle>
   <p:extLst>
     <p:ext uri="{EFAFB233-063F-42B5-8137-9DF3F51BA10A}">
-      <p15:sldGuideLst xmlns="" xmlns:p15="http://schemas.microsoft.com/office/powerpoint/2012/main">
+      <p15:sldGuideLst xmlns:p15="http://schemas.microsoft.com/office/powerpoint/2012/main" xmlns="">
         <p15:guide id="1" orient="horz" pos="1620">
           <p15:clr>
             <a:srgbClr val="A4A3A4"/>
@@ -6658,12 +6658,13 @@
           <a:p>
             <a:r>
               <a:rPr lang="en" sz="800" dirty="0"/>
-              <a:t>[Pictured Left to Right: Harrison Owens,Kenneth Zachary</a:t>
+              <a:t>[Pictured Left to Right: Harrison Owens,Kenneth </a:t>
             </a:r>
             <a:r>
               <a:rPr lang="en" sz="800" dirty="0" smtClean="0"/>
-              <a:t>,</a:t>
+              <a:t>Zach,</a:t>
             </a:r>
+            <a:endParaRPr lang="en" sz="800" dirty="0" smtClean="0"/>
           </a:p>
           <a:p>
             <a:r>
@@ -7547,8 +7548,23 @@
             </a:pPr>
             <a:r>
               <a:rPr lang="en-US" sz="2400" dirty="0" smtClean="0"/>
-              <a:t>Received dynamic range: entirely covered by one part; circuitry may require RF shielding</a:t>
+              <a:t>Received dynamic range: entirely covered by one part; circuitry may require RF </a:t>
             </a:r>
+            <a:r>
+              <a:rPr lang="en-US" sz="2400" dirty="0" smtClean="0"/>
+              <a:t>shielding</a:t>
+            </a:r>
+          </a:p>
+          <a:p>
+            <a:pPr marL="342900" indent="-342900">
+              <a:buFont typeface="Arial" panose="020B0604020202020204" pitchFamily="34" charset="0"/>
+              <a:buChar char="•"/>
+            </a:pPr>
+            <a:r>
+              <a:rPr lang="en-US" sz="2400" dirty="0" smtClean="0"/>
+              <a:t>PC interface: USB, CDC (communications device class)</a:t>
+            </a:r>
+            <a:endParaRPr lang="en-US" sz="2400" dirty="0" smtClean="0"/>
           </a:p>
           <a:p>
             <a:pPr marL="342900" indent="-342900">
@@ -7873,7 +7889,6 @@
               <a:rPr lang="en-US" dirty="0" smtClean="0"/>
               <a:t>Documentation:</a:t>
             </a:r>
-            <a:endParaRPr lang="en-US" dirty="0" smtClean="0"/>
           </a:p>
           <a:p>
             <a:pPr marL="457200" indent="-457200">
@@ -7882,19 +7897,7 @@
             </a:pPr>
             <a:r>
               <a:rPr lang="en-US" dirty="0" smtClean="0"/>
-              <a:t>Parts </a:t>
-            </a:r>
-            <a:r>
-              <a:rPr lang="en-US" dirty="0" smtClean="0"/>
-              <a:t>that we are using </a:t>
-            </a:r>
-            <a:r>
-              <a:rPr lang="en-US" dirty="0" smtClean="0"/>
-              <a:t>are not always well </a:t>
-            </a:r>
-            <a:r>
-              <a:rPr lang="en-US" dirty="0" smtClean="0"/>
-              <a:t>documented</a:t>
+              <a:t>Parts that we are using are not always well documented</a:t>
             </a:r>
             <a:endParaRPr lang="en-US" dirty="0"/>
           </a:p>

</xml_diff>

<commit_message>
One last change to SAP
</commit_message>
<xml_diff>
--- a/official/WCP52 Gain-Phase System Architecture Presentation.pptx
+++ b/official/WCP52 Gain-Phase System Architecture Presentation.pptx
@@ -236,7 +236,7 @@
   </p:defaultTextStyle>
   <p:extLst>
     <p:ext uri="{EFAFB233-063F-42B5-8137-9DF3F51BA10A}">
-      <p15:sldGuideLst xmlns:p15="http://schemas.microsoft.com/office/powerpoint/2012/main" xmlns="">
+      <p15:sldGuideLst xmlns="" xmlns:p15="http://schemas.microsoft.com/office/powerpoint/2012/main">
         <p15:guide id="1" orient="horz" pos="1620">
           <p15:clr>
             <a:srgbClr val="A4A3A4"/>
@@ -5938,7 +5938,7 @@
             </a:pPr>
             <a:r>
               <a:rPr lang="en" sz="1800" dirty="0" smtClean="0"/>
-              <a:t>90% </a:t>
+              <a:t>100% </a:t>
             </a:r>
             <a:r>
               <a:rPr lang="en" sz="1800" dirty="0"/>
@@ -5950,28 +5950,15 @@
               <a:spcBef>
                 <a:spcPts val="0"/>
               </a:spcBef>
-              <a:buClr>
-                <a:schemeClr val="dk1"/>
-              </a:buClr>
-              <a:buSzPct val="61111"/>
-              <a:buFont typeface="Arial"/>
               <a:buNone/>
             </a:pPr>
             <a:r>
-              <a:rPr lang="en" sz="1800" dirty="0"/>
-              <a:t>0% Detailed Design / CDR: 2014‐12‐05</a:t>
+              <a:rPr lang="en" sz="1800" dirty="0" smtClean="0"/>
+              <a:t>0</a:t>
             </a:r>
-          </a:p>
-          <a:p>
-            <a:pPr lvl="0" rtl="0">
-              <a:spcBef>
-                <a:spcPts val="0"/>
-              </a:spcBef>
-              <a:buNone/>
-            </a:pPr>
             <a:r>
               <a:rPr lang="en" sz="1800" dirty="0"/>
-              <a:t>0% Interim Presentation: </a:t>
+              <a:t>% Interim Presentation: </a:t>
             </a:r>
             <a:r>
               <a:rPr lang="en" sz="1800" dirty="0" smtClean="0"/>
@@ -6664,7 +6651,6 @@
               <a:rPr lang="en" sz="800" dirty="0" smtClean="0"/>
               <a:t>Zach,</a:t>
             </a:r>
-            <a:endParaRPr lang="en" sz="800" dirty="0" smtClean="0"/>
           </a:p>
           <a:p>
             <a:r>
@@ -7548,11 +7534,7 @@
             </a:pPr>
             <a:r>
               <a:rPr lang="en-US" sz="2400" dirty="0" smtClean="0"/>
-              <a:t>Received dynamic range: entirely covered by one part; circuitry may require RF </a:t>
-            </a:r>
-            <a:r>
-              <a:rPr lang="en-US" sz="2400" dirty="0" smtClean="0"/>
-              <a:t>shielding</a:t>
+              <a:t>Received dynamic range: entirely covered by one part; circuitry may require RF shielding</a:t>
             </a:r>
           </a:p>
           <a:p>
@@ -7564,7 +7546,6 @@
               <a:rPr lang="en-US" sz="2400" dirty="0" smtClean="0"/>
               <a:t>PC interface: USB, CDC (communications device class)</a:t>
             </a:r>
-            <a:endParaRPr lang="en-US" sz="2400" dirty="0" smtClean="0"/>
           </a:p>
           <a:p>
             <a:pPr marL="342900" indent="-342900">

</xml_diff>